<commit_message>
i was trying out the first stages of some non homogenous markov chains, really didn't get anywhere
</commit_message>
<xml_diff>
--- a/meta_analysis/figures/sampling figure .pptx
+++ b/meta_analysis/figures/sampling figure .pptx
@@ -6,6 +6,7 @@
   </p:sldMasterIdLst>
   <p:sldIdLst>
     <p:sldId id="256" r:id="rId2"/>
+    <p:sldId id="257" r:id="rId3"/>
   </p:sldIdLst>
   <p:sldSz cx="9144000" cy="6858000" type="screen4x3"/>
   <p:notesSz cx="6858000" cy="9144000"/>
@@ -288,7 +289,7 @@
           <a:p>
             <a:fld id="{16DF9486-CE29-4149-ABDD-2E2C8D80D505}" type="datetimeFigureOut">
               <a:rPr lang="en-US" smtClean="0"/>
-              <a:t>11/6/17</a:t>
+              <a:t>11/15/17</a:t>
             </a:fld>
             <a:endParaRPr lang="en-US"/>
           </a:p>
@@ -458,7 +459,7 @@
           <a:p>
             <a:fld id="{16DF9486-CE29-4149-ABDD-2E2C8D80D505}" type="datetimeFigureOut">
               <a:rPr lang="en-US" smtClean="0"/>
-              <a:t>11/6/17</a:t>
+              <a:t>11/15/17</a:t>
             </a:fld>
             <a:endParaRPr lang="en-US"/>
           </a:p>
@@ -638,7 +639,7 @@
           <a:p>
             <a:fld id="{16DF9486-CE29-4149-ABDD-2E2C8D80D505}" type="datetimeFigureOut">
               <a:rPr lang="en-US" smtClean="0"/>
-              <a:t>11/6/17</a:t>
+              <a:t>11/15/17</a:t>
             </a:fld>
             <a:endParaRPr lang="en-US"/>
           </a:p>
@@ -808,7 +809,7 @@
           <a:p>
             <a:fld id="{16DF9486-CE29-4149-ABDD-2E2C8D80D505}" type="datetimeFigureOut">
               <a:rPr lang="en-US" smtClean="0"/>
-              <a:t>11/6/17</a:t>
+              <a:t>11/15/17</a:t>
             </a:fld>
             <a:endParaRPr lang="en-US"/>
           </a:p>
@@ -1054,7 +1055,7 @@
           <a:p>
             <a:fld id="{16DF9486-CE29-4149-ABDD-2E2C8D80D505}" type="datetimeFigureOut">
               <a:rPr lang="en-US" smtClean="0"/>
-              <a:t>11/6/17</a:t>
+              <a:t>11/15/17</a:t>
             </a:fld>
             <a:endParaRPr lang="en-US"/>
           </a:p>
@@ -1342,7 +1343,7 @@
           <a:p>
             <a:fld id="{16DF9486-CE29-4149-ABDD-2E2C8D80D505}" type="datetimeFigureOut">
               <a:rPr lang="en-US" smtClean="0"/>
-              <a:t>11/6/17</a:t>
+              <a:t>11/15/17</a:t>
             </a:fld>
             <a:endParaRPr lang="en-US"/>
           </a:p>
@@ -1764,7 +1765,7 @@
           <a:p>
             <a:fld id="{16DF9486-CE29-4149-ABDD-2E2C8D80D505}" type="datetimeFigureOut">
               <a:rPr lang="en-US" smtClean="0"/>
-              <a:t>11/6/17</a:t>
+              <a:t>11/15/17</a:t>
             </a:fld>
             <a:endParaRPr lang="en-US"/>
           </a:p>
@@ -1882,7 +1883,7 @@
           <a:p>
             <a:fld id="{16DF9486-CE29-4149-ABDD-2E2C8D80D505}" type="datetimeFigureOut">
               <a:rPr lang="en-US" smtClean="0"/>
-              <a:t>11/6/17</a:t>
+              <a:t>11/15/17</a:t>
             </a:fld>
             <a:endParaRPr lang="en-US"/>
           </a:p>
@@ -1977,7 +1978,7 @@
           <a:p>
             <a:fld id="{16DF9486-CE29-4149-ABDD-2E2C8D80D505}" type="datetimeFigureOut">
               <a:rPr lang="en-US" smtClean="0"/>
-              <a:t>11/6/17</a:t>
+              <a:t>11/15/17</a:t>
             </a:fld>
             <a:endParaRPr lang="en-US"/>
           </a:p>
@@ -2254,7 +2255,7 @@
           <a:p>
             <a:fld id="{16DF9486-CE29-4149-ABDD-2E2C8D80D505}" type="datetimeFigureOut">
               <a:rPr lang="en-US" smtClean="0"/>
-              <a:t>11/6/17</a:t>
+              <a:t>11/15/17</a:t>
             </a:fld>
             <a:endParaRPr lang="en-US"/>
           </a:p>
@@ -2507,7 +2508,7 @@
           <a:p>
             <a:fld id="{16DF9486-CE29-4149-ABDD-2E2C8D80D505}" type="datetimeFigureOut">
               <a:rPr lang="en-US" smtClean="0"/>
-              <a:t>11/6/17</a:t>
+              <a:t>11/15/17</a:t>
             </a:fld>
             <a:endParaRPr lang="en-US"/>
           </a:p>
@@ -2720,7 +2721,7 @@
           <a:p>
             <a:fld id="{16DF9486-CE29-4149-ABDD-2E2C8D80D505}" type="datetimeFigureOut">
               <a:rPr lang="en-US" smtClean="0"/>
-              <a:t>11/6/17</a:t>
+              <a:t>11/15/17</a:t>
             </a:fld>
             <a:endParaRPr lang="en-US"/>
           </a:p>
@@ -3328,6 +3329,583 @@
 </p:sld>
 </file>
 
+<file path=ppt/slides/slide2.xml><?xml version="1.0" encoding="utf-8"?>
+<p:sld xmlns:a="http://schemas.openxmlformats.org/drawingml/2006/main" xmlns:r="http://schemas.openxmlformats.org/officeDocument/2006/relationships" xmlns:p="http://schemas.openxmlformats.org/presentationml/2006/main">
+  <p:cSld>
+    <p:spTree>
+      <p:nvGrpSpPr>
+        <p:cNvPr id="1" name=""/>
+        <p:cNvGrpSpPr/>
+        <p:nvPr/>
+      </p:nvGrpSpPr>
+      <p:grpSpPr>
+        <a:xfrm>
+          <a:off x="0" y="0"/>
+          <a:ext cx="0" cy="0"/>
+          <a:chOff x="0" y="0"/>
+          <a:chExt cx="0" cy="0"/>
+        </a:xfrm>
+      </p:grpSpPr>
+      <p:pic>
+        <p:nvPicPr>
+          <p:cNvPr id="5" name="Picture 4"/>
+          <p:cNvPicPr>
+            <a:picLocks noChangeAspect="1"/>
+          </p:cNvPicPr>
+          <p:nvPr/>
+        </p:nvPicPr>
+        <p:blipFill>
+          <a:blip r:embed="rId2"/>
+          <a:stretch>
+            <a:fillRect/>
+          </a:stretch>
+        </p:blipFill>
+        <p:spPr>
+          <a:xfrm>
+            <a:off x="418043" y="4591496"/>
+            <a:ext cx="5783803" cy="1382470"/>
+          </a:xfrm>
+          <a:prstGeom prst="rect">
+            <a:avLst/>
+          </a:prstGeom>
+        </p:spPr>
+      </p:pic>
+      <p:pic>
+        <p:nvPicPr>
+          <p:cNvPr id="10" name="Picture 9"/>
+          <p:cNvPicPr>
+            <a:picLocks noChangeAspect="1"/>
+          </p:cNvPicPr>
+          <p:nvPr/>
+        </p:nvPicPr>
+        <p:blipFill>
+          <a:blip r:embed="rId3"/>
+          <a:stretch>
+            <a:fillRect/>
+          </a:stretch>
+        </p:blipFill>
+        <p:spPr>
+          <a:xfrm>
+            <a:off x="521529" y="5220714"/>
+            <a:ext cx="164618" cy="526778"/>
+          </a:xfrm>
+          <a:prstGeom prst="rect">
+            <a:avLst/>
+          </a:prstGeom>
+        </p:spPr>
+      </p:pic>
+      <p:sp>
+        <p:nvSpPr>
+          <p:cNvPr id="11" name="TextBox 10"/>
+          <p:cNvSpPr txBox="1"/>
+          <p:nvPr/>
+        </p:nvSpPr>
+        <p:spPr>
+          <a:xfrm>
+            <a:off x="0" y="45363"/>
+            <a:ext cx="431110" cy="369332"/>
+          </a:xfrm>
+          <a:prstGeom prst="rect">
+            <a:avLst/>
+          </a:prstGeom>
+          <a:noFill/>
+        </p:spPr>
+        <p:txBody>
+          <a:bodyPr wrap="square" rtlCol="0">
+            <a:spAutoFit/>
+          </a:bodyPr>
+          <a:lstStyle/>
+          <a:p>
+            <a:r>
+              <a:rPr lang="en-US" dirty="0" smtClean="0">
+                <a:latin typeface="Arial Black"/>
+                <a:cs typeface="Arial Black"/>
+              </a:rPr>
+              <a:t>A</a:t>
+            </a:r>
+            <a:endParaRPr lang="en-US" dirty="0">
+              <a:latin typeface="Arial Black"/>
+              <a:cs typeface="Arial Black"/>
+            </a:endParaRPr>
+          </a:p>
+        </p:txBody>
+      </p:sp>
+      <p:sp>
+        <p:nvSpPr>
+          <p:cNvPr id="12" name="TextBox 11"/>
+          <p:cNvSpPr txBox="1"/>
+          <p:nvPr/>
+        </p:nvSpPr>
+        <p:spPr>
+          <a:xfrm>
+            <a:off x="0" y="4748642"/>
+            <a:ext cx="431110" cy="369332"/>
+          </a:xfrm>
+          <a:prstGeom prst="rect">
+            <a:avLst/>
+          </a:prstGeom>
+          <a:noFill/>
+        </p:spPr>
+        <p:txBody>
+          <a:bodyPr wrap="square" rtlCol="0">
+            <a:spAutoFit/>
+          </a:bodyPr>
+          <a:lstStyle/>
+          <a:p>
+            <a:r>
+              <a:rPr lang="en-US" dirty="0" smtClean="0">
+                <a:latin typeface="Arial Black"/>
+                <a:cs typeface="Arial Black"/>
+              </a:rPr>
+              <a:t>B</a:t>
+            </a:r>
+          </a:p>
+        </p:txBody>
+      </p:sp>
+      <p:sp>
+        <p:nvSpPr>
+          <p:cNvPr id="16" name="TextBox 15"/>
+          <p:cNvSpPr txBox="1"/>
+          <p:nvPr/>
+        </p:nvSpPr>
+        <p:spPr>
+          <a:xfrm>
+            <a:off x="5832406" y="191293"/>
+            <a:ext cx="3311594" cy="3108544"/>
+          </a:xfrm>
+          <a:prstGeom prst="rect">
+            <a:avLst/>
+          </a:prstGeom>
+          <a:noFill/>
+        </p:spPr>
+        <p:txBody>
+          <a:bodyPr wrap="square" rtlCol="0">
+            <a:spAutoFit/>
+          </a:bodyPr>
+          <a:lstStyle/>
+          <a:p>
+            <a:r>
+              <a:rPr lang="en-US" sz="1400" b="1" dirty="0" smtClean="0">
+                <a:latin typeface="Arial Black"/>
+                <a:cs typeface="Arial Black"/>
+              </a:rPr>
+              <a:t>Fig XX. Sampling &amp; Reporting Strategy</a:t>
+            </a:r>
+          </a:p>
+          <a:p>
+            <a:r>
+              <a:rPr lang="en-US" sz="1400" b="1" dirty="0" smtClean="0">
+                <a:latin typeface="Arial"/>
+                <a:cs typeface="Arial"/>
+              </a:rPr>
+              <a:t>A. A schematic displaying a theoretical change in seroprevalence over the course of a year. Colored regions represent sampling schemes present in </a:t>
+            </a:r>
+            <a:r>
+              <a:rPr lang="en-US" sz="1400" b="1" dirty="0" err="1" smtClean="0">
+                <a:latin typeface="Arial"/>
+                <a:cs typeface="Arial"/>
+              </a:rPr>
+              <a:t>filovirus</a:t>
+            </a:r>
+            <a:r>
+              <a:rPr lang="en-US" sz="1400" b="1" dirty="0" smtClean="0">
+                <a:latin typeface="Arial"/>
+                <a:cs typeface="Arial"/>
+              </a:rPr>
+              <a:t>/</a:t>
+            </a:r>
+            <a:r>
+              <a:rPr lang="en-US" sz="1400" b="1" dirty="0" err="1" smtClean="0">
+                <a:latin typeface="Arial"/>
+                <a:cs typeface="Arial"/>
+              </a:rPr>
+              <a:t>henipavirus</a:t>
+            </a:r>
+            <a:r>
+              <a:rPr lang="en-US" sz="1400" b="1" dirty="0" smtClean="0">
+                <a:latin typeface="Arial"/>
+                <a:cs typeface="Arial"/>
+              </a:rPr>
+              <a:t> literature. B. Breakdown of sampling schemes present in literature. Includes mean time (in days) and standard deviation over which studies pooled multiple sampling events into single estimate. </a:t>
+            </a:r>
+            <a:endParaRPr lang="en-US" sz="1400" b="1" dirty="0">
+              <a:latin typeface="Arial"/>
+              <a:cs typeface="Arial"/>
+            </a:endParaRPr>
+          </a:p>
+        </p:txBody>
+      </p:sp>
+      <p:pic>
+        <p:nvPicPr>
+          <p:cNvPr id="2" name="Picture 1"/>
+          <p:cNvPicPr>
+            <a:picLocks noChangeAspect="1"/>
+          </p:cNvPicPr>
+          <p:nvPr/>
+        </p:nvPicPr>
+        <p:blipFill>
+          <a:blip r:embed="rId4"/>
+          <a:stretch>
+            <a:fillRect/>
+          </a:stretch>
+        </p:blipFill>
+        <p:spPr>
+          <a:xfrm>
+            <a:off x="330462" y="93678"/>
+            <a:ext cx="5501944" cy="4527757"/>
+          </a:xfrm>
+          <a:prstGeom prst="rect">
+            <a:avLst/>
+          </a:prstGeom>
+        </p:spPr>
+      </p:pic>
+      <p:sp>
+        <p:nvSpPr>
+          <p:cNvPr id="13" name="Oval 12"/>
+          <p:cNvSpPr/>
+          <p:nvPr/>
+        </p:nvSpPr>
+        <p:spPr>
+          <a:xfrm>
+            <a:off x="4695457" y="3299837"/>
+            <a:ext cx="192245" cy="192240"/>
+          </a:xfrm>
+          <a:prstGeom prst="ellipse">
+            <a:avLst/>
+          </a:prstGeom>
+          <a:solidFill>
+            <a:srgbClr val="0000FF">
+              <a:alpha val="48000"/>
+            </a:srgbClr>
+          </a:solidFill>
+          <a:ln>
+            <a:noFill/>
+          </a:ln>
+          <a:effectLst/>
+        </p:spPr>
+        <p:style>
+          <a:lnRef idx="1">
+            <a:schemeClr val="accent1"/>
+          </a:lnRef>
+          <a:fillRef idx="3">
+            <a:schemeClr val="accent1"/>
+          </a:fillRef>
+          <a:effectRef idx="2">
+            <a:schemeClr val="accent1"/>
+          </a:effectRef>
+          <a:fontRef idx="minor">
+            <a:schemeClr val="lt1"/>
+          </a:fontRef>
+        </p:style>
+        <p:txBody>
+          <a:bodyPr rtlCol="0" anchor="ctr"/>
+          <a:lstStyle/>
+          <a:p>
+            <a:pPr algn="ctr"/>
+            <a:endParaRPr lang="en-US"/>
+          </a:p>
+        </p:txBody>
+      </p:sp>
+      <p:sp>
+        <p:nvSpPr>
+          <p:cNvPr id="14" name="Oval 13"/>
+          <p:cNvSpPr/>
+          <p:nvPr/>
+        </p:nvSpPr>
+        <p:spPr>
+          <a:xfrm>
+            <a:off x="5159498" y="1201768"/>
+            <a:ext cx="192245" cy="192240"/>
+          </a:xfrm>
+          <a:prstGeom prst="ellipse">
+            <a:avLst/>
+          </a:prstGeom>
+          <a:solidFill>
+            <a:srgbClr val="0000FF">
+              <a:alpha val="48000"/>
+            </a:srgbClr>
+          </a:solidFill>
+          <a:ln>
+            <a:noFill/>
+          </a:ln>
+          <a:effectLst/>
+        </p:spPr>
+        <p:style>
+          <a:lnRef idx="1">
+            <a:schemeClr val="accent1"/>
+          </a:lnRef>
+          <a:fillRef idx="3">
+            <a:schemeClr val="accent1"/>
+          </a:fillRef>
+          <a:effectRef idx="2">
+            <a:schemeClr val="accent1"/>
+          </a:effectRef>
+          <a:fontRef idx="minor">
+            <a:schemeClr val="lt1"/>
+          </a:fontRef>
+        </p:style>
+        <p:txBody>
+          <a:bodyPr rtlCol="0" anchor="ctr"/>
+          <a:lstStyle/>
+          <a:p>
+            <a:pPr algn="ctr"/>
+            <a:endParaRPr lang="en-US"/>
+          </a:p>
+        </p:txBody>
+      </p:sp>
+      <p:sp>
+        <p:nvSpPr>
+          <p:cNvPr id="17" name="Oval 16"/>
+          <p:cNvSpPr/>
+          <p:nvPr/>
+        </p:nvSpPr>
+        <p:spPr>
+          <a:xfrm>
+            <a:off x="3054481" y="1620409"/>
+            <a:ext cx="192245" cy="192240"/>
+          </a:xfrm>
+          <a:prstGeom prst="ellipse">
+            <a:avLst/>
+          </a:prstGeom>
+          <a:solidFill>
+            <a:srgbClr val="0000FF">
+              <a:alpha val="48000"/>
+            </a:srgbClr>
+          </a:solidFill>
+          <a:ln>
+            <a:noFill/>
+          </a:ln>
+          <a:effectLst/>
+        </p:spPr>
+        <p:style>
+          <a:lnRef idx="1">
+            <a:schemeClr val="accent1"/>
+          </a:lnRef>
+          <a:fillRef idx="3">
+            <a:schemeClr val="accent1"/>
+          </a:fillRef>
+          <a:effectRef idx="2">
+            <a:schemeClr val="accent1"/>
+          </a:effectRef>
+          <a:fontRef idx="minor">
+            <a:schemeClr val="lt1"/>
+          </a:fontRef>
+        </p:style>
+        <p:txBody>
+          <a:bodyPr rtlCol="0" anchor="ctr"/>
+          <a:lstStyle/>
+          <a:p>
+            <a:pPr algn="ctr"/>
+            <a:endParaRPr lang="en-US"/>
+          </a:p>
+        </p:txBody>
+      </p:sp>
+      <p:sp>
+        <p:nvSpPr>
+          <p:cNvPr id="18" name="Oval 17"/>
+          <p:cNvSpPr/>
+          <p:nvPr/>
+        </p:nvSpPr>
+        <p:spPr>
+          <a:xfrm>
+            <a:off x="2347603" y="3891392"/>
+            <a:ext cx="192245" cy="192240"/>
+          </a:xfrm>
+          <a:prstGeom prst="ellipse">
+            <a:avLst/>
+          </a:prstGeom>
+          <a:solidFill>
+            <a:srgbClr val="0000FF">
+              <a:alpha val="48000"/>
+            </a:srgbClr>
+          </a:solidFill>
+          <a:ln>
+            <a:noFill/>
+          </a:ln>
+          <a:effectLst/>
+        </p:spPr>
+        <p:style>
+          <a:lnRef idx="1">
+            <a:schemeClr val="accent1"/>
+          </a:lnRef>
+          <a:fillRef idx="3">
+            <a:schemeClr val="accent1"/>
+          </a:fillRef>
+          <a:effectRef idx="2">
+            <a:schemeClr val="accent1"/>
+          </a:effectRef>
+          <a:fontRef idx="minor">
+            <a:schemeClr val="lt1"/>
+          </a:fontRef>
+        </p:style>
+        <p:txBody>
+          <a:bodyPr rtlCol="0" anchor="ctr"/>
+          <a:lstStyle/>
+          <a:p>
+            <a:pPr algn="ctr"/>
+            <a:endParaRPr lang="en-US"/>
+          </a:p>
+        </p:txBody>
+      </p:sp>
+      <p:sp>
+        <p:nvSpPr>
+          <p:cNvPr id="19" name="Oval 18"/>
+          <p:cNvSpPr/>
+          <p:nvPr/>
+        </p:nvSpPr>
+        <p:spPr>
+          <a:xfrm>
+            <a:off x="1835886" y="2246644"/>
+            <a:ext cx="192245" cy="192240"/>
+          </a:xfrm>
+          <a:prstGeom prst="ellipse">
+            <a:avLst/>
+          </a:prstGeom>
+          <a:solidFill>
+            <a:srgbClr val="0000FF">
+              <a:alpha val="48000"/>
+            </a:srgbClr>
+          </a:solidFill>
+          <a:ln>
+            <a:noFill/>
+          </a:ln>
+          <a:effectLst/>
+        </p:spPr>
+        <p:style>
+          <a:lnRef idx="1">
+            <a:schemeClr val="accent1"/>
+          </a:lnRef>
+          <a:fillRef idx="3">
+            <a:schemeClr val="accent1"/>
+          </a:fillRef>
+          <a:effectRef idx="2">
+            <a:schemeClr val="accent1"/>
+          </a:effectRef>
+          <a:fontRef idx="minor">
+            <a:schemeClr val="lt1"/>
+          </a:fontRef>
+        </p:style>
+        <p:txBody>
+          <a:bodyPr rtlCol="0" anchor="ctr"/>
+          <a:lstStyle/>
+          <a:p>
+            <a:pPr algn="ctr"/>
+            <a:endParaRPr lang="en-US"/>
+          </a:p>
+        </p:txBody>
+      </p:sp>
+      <p:sp>
+        <p:nvSpPr>
+          <p:cNvPr id="20" name="Oval 19"/>
+          <p:cNvSpPr/>
+          <p:nvPr/>
+        </p:nvSpPr>
+        <p:spPr>
+          <a:xfrm>
+            <a:off x="1324168" y="1297888"/>
+            <a:ext cx="192245" cy="192240"/>
+          </a:xfrm>
+          <a:prstGeom prst="ellipse">
+            <a:avLst/>
+          </a:prstGeom>
+          <a:solidFill>
+            <a:srgbClr val="0000FF">
+              <a:alpha val="48000"/>
+            </a:srgbClr>
+          </a:solidFill>
+          <a:ln>
+            <a:noFill/>
+          </a:ln>
+          <a:effectLst/>
+        </p:spPr>
+        <p:style>
+          <a:lnRef idx="1">
+            <a:schemeClr val="accent1"/>
+          </a:lnRef>
+          <a:fillRef idx="3">
+            <a:schemeClr val="accent1"/>
+          </a:fillRef>
+          <a:effectRef idx="2">
+            <a:schemeClr val="accent1"/>
+          </a:effectRef>
+          <a:fontRef idx="minor">
+            <a:schemeClr val="lt1"/>
+          </a:fontRef>
+        </p:style>
+        <p:txBody>
+          <a:bodyPr rtlCol="0" anchor="ctr"/>
+          <a:lstStyle/>
+          <a:p>
+            <a:pPr algn="ctr"/>
+            <a:endParaRPr lang="en-US"/>
+          </a:p>
+        </p:txBody>
+      </p:sp>
+      <p:sp>
+        <p:nvSpPr>
+          <p:cNvPr id="21" name="Oval 20"/>
+          <p:cNvSpPr/>
+          <p:nvPr/>
+        </p:nvSpPr>
+        <p:spPr>
+          <a:xfrm>
+            <a:off x="3916721" y="2523352"/>
+            <a:ext cx="192245" cy="192240"/>
+          </a:xfrm>
+          <a:prstGeom prst="ellipse">
+            <a:avLst/>
+          </a:prstGeom>
+          <a:solidFill>
+            <a:schemeClr val="tx1"/>
+          </a:solidFill>
+          <a:ln>
+            <a:noFill/>
+          </a:ln>
+          <a:effectLst/>
+        </p:spPr>
+        <p:style>
+          <a:lnRef idx="1">
+            <a:schemeClr val="accent1"/>
+          </a:lnRef>
+          <a:fillRef idx="3">
+            <a:schemeClr val="accent1"/>
+          </a:fillRef>
+          <a:effectRef idx="2">
+            <a:schemeClr val="accent1"/>
+          </a:effectRef>
+          <a:fontRef idx="minor">
+            <a:schemeClr val="lt1"/>
+          </a:fontRef>
+        </p:style>
+        <p:txBody>
+          <a:bodyPr rtlCol="0" anchor="ctr"/>
+          <a:lstStyle/>
+          <a:p>
+            <a:pPr algn="ctr"/>
+            <a:endParaRPr lang="en-US"/>
+          </a:p>
+        </p:txBody>
+      </p:sp>
+    </p:spTree>
+    <p:extLst>
+      <p:ext uri="{BB962C8B-B14F-4D97-AF65-F5344CB8AC3E}">
+        <p14:creationId xmlns:p14="http://schemas.microsoft.com/office/powerpoint/2010/main" val="2082559276"/>
+      </p:ext>
+    </p:extLst>
+  </p:cSld>
+  <p:clrMapOvr>
+    <a:masterClrMapping/>
+  </p:clrMapOvr>
+  <p:timing>
+    <p:tnLst>
+      <p:par>
+        <p:cTn xmlns:p14="http://schemas.microsoft.com/office/powerpoint/2010/main" id="1" dur="indefinite" restart="never" nodeType="tmRoot"/>
+      </p:par>
+    </p:tnLst>
+  </p:timing>
+</p:sld>
+</file>
+
 <file path=ppt/theme/theme1.xml><?xml version="1.0" encoding="utf-8"?>
 <a:theme xmlns:a="http://schemas.openxmlformats.org/drawingml/2006/main" name="Office Theme">
   <a:themeElements>

</xml_diff>

<commit_message>
power point of my images
</commit_message>
<xml_diff>
--- a/meta_analysis/figures/sampling figure .pptx
+++ b/meta_analysis/figures/sampling figure .pptx
@@ -7,6 +7,7 @@
   <p:sldIdLst>
     <p:sldId id="256" r:id="rId2"/>
     <p:sldId id="257" r:id="rId3"/>
+    <p:sldId id="258" r:id="rId4"/>
   </p:sldIdLst>
   <p:sldSz cx="9144000" cy="6858000" type="screen4x3"/>
   <p:notesSz cx="6858000" cy="9144000"/>
@@ -289,7 +290,7 @@
           <a:p>
             <a:fld id="{16DF9486-CE29-4149-ABDD-2E2C8D80D505}" type="datetimeFigureOut">
               <a:rPr lang="en-US" smtClean="0"/>
-              <a:t>11/15/17</a:t>
+              <a:t>12/11/17</a:t>
             </a:fld>
             <a:endParaRPr lang="en-US"/>
           </a:p>
@@ -459,7 +460,7 @@
           <a:p>
             <a:fld id="{16DF9486-CE29-4149-ABDD-2E2C8D80D505}" type="datetimeFigureOut">
               <a:rPr lang="en-US" smtClean="0"/>
-              <a:t>11/15/17</a:t>
+              <a:t>12/11/17</a:t>
             </a:fld>
             <a:endParaRPr lang="en-US"/>
           </a:p>
@@ -639,7 +640,7 @@
           <a:p>
             <a:fld id="{16DF9486-CE29-4149-ABDD-2E2C8D80D505}" type="datetimeFigureOut">
               <a:rPr lang="en-US" smtClean="0"/>
-              <a:t>11/15/17</a:t>
+              <a:t>12/11/17</a:t>
             </a:fld>
             <a:endParaRPr lang="en-US"/>
           </a:p>
@@ -809,7 +810,7 @@
           <a:p>
             <a:fld id="{16DF9486-CE29-4149-ABDD-2E2C8D80D505}" type="datetimeFigureOut">
               <a:rPr lang="en-US" smtClean="0"/>
-              <a:t>11/15/17</a:t>
+              <a:t>12/11/17</a:t>
             </a:fld>
             <a:endParaRPr lang="en-US"/>
           </a:p>
@@ -1055,7 +1056,7 @@
           <a:p>
             <a:fld id="{16DF9486-CE29-4149-ABDD-2E2C8D80D505}" type="datetimeFigureOut">
               <a:rPr lang="en-US" smtClean="0"/>
-              <a:t>11/15/17</a:t>
+              <a:t>12/11/17</a:t>
             </a:fld>
             <a:endParaRPr lang="en-US"/>
           </a:p>
@@ -1343,7 +1344,7 @@
           <a:p>
             <a:fld id="{16DF9486-CE29-4149-ABDD-2E2C8D80D505}" type="datetimeFigureOut">
               <a:rPr lang="en-US" smtClean="0"/>
-              <a:t>11/15/17</a:t>
+              <a:t>12/11/17</a:t>
             </a:fld>
             <a:endParaRPr lang="en-US"/>
           </a:p>
@@ -1765,7 +1766,7 @@
           <a:p>
             <a:fld id="{16DF9486-CE29-4149-ABDD-2E2C8D80D505}" type="datetimeFigureOut">
               <a:rPr lang="en-US" smtClean="0"/>
-              <a:t>11/15/17</a:t>
+              <a:t>12/11/17</a:t>
             </a:fld>
             <a:endParaRPr lang="en-US"/>
           </a:p>
@@ -1883,7 +1884,7 @@
           <a:p>
             <a:fld id="{16DF9486-CE29-4149-ABDD-2E2C8D80D505}" type="datetimeFigureOut">
               <a:rPr lang="en-US" smtClean="0"/>
-              <a:t>11/15/17</a:t>
+              <a:t>12/11/17</a:t>
             </a:fld>
             <a:endParaRPr lang="en-US"/>
           </a:p>
@@ -1978,7 +1979,7 @@
           <a:p>
             <a:fld id="{16DF9486-CE29-4149-ABDD-2E2C8D80D505}" type="datetimeFigureOut">
               <a:rPr lang="en-US" smtClean="0"/>
-              <a:t>11/15/17</a:t>
+              <a:t>12/11/17</a:t>
             </a:fld>
             <a:endParaRPr lang="en-US"/>
           </a:p>
@@ -2255,7 +2256,7 @@
           <a:p>
             <a:fld id="{16DF9486-CE29-4149-ABDD-2E2C8D80D505}" type="datetimeFigureOut">
               <a:rPr lang="en-US" smtClean="0"/>
-              <a:t>11/15/17</a:t>
+              <a:t>12/11/17</a:t>
             </a:fld>
             <a:endParaRPr lang="en-US"/>
           </a:p>
@@ -2508,7 +2509,7 @@
           <a:p>
             <a:fld id="{16DF9486-CE29-4149-ABDD-2E2C8D80D505}" type="datetimeFigureOut">
               <a:rPr lang="en-US" smtClean="0"/>
-              <a:t>11/15/17</a:t>
+              <a:t>12/11/17</a:t>
             </a:fld>
             <a:endParaRPr lang="en-US"/>
           </a:p>
@@ -2721,7 +2722,7 @@
           <a:p>
             <a:fld id="{16DF9486-CE29-4149-ABDD-2E2C8D80D505}" type="datetimeFigureOut">
               <a:rPr lang="en-US" smtClean="0"/>
-              <a:t>11/15/17</a:t>
+              <a:t>12/11/17</a:t>
             </a:fld>
             <a:endParaRPr lang="en-US"/>
           </a:p>
@@ -3903,6 +3904,270 @@
       </p:par>
     </p:tnLst>
   </p:timing>
+</p:sld>
+</file>
+
+<file path=ppt/slides/slide3.xml><?xml version="1.0" encoding="utf-8"?>
+<p:sld xmlns:a="http://schemas.openxmlformats.org/drawingml/2006/main" xmlns:r="http://schemas.openxmlformats.org/officeDocument/2006/relationships" xmlns:p="http://schemas.openxmlformats.org/presentationml/2006/main">
+  <p:cSld>
+    <p:spTree>
+      <p:nvGrpSpPr>
+        <p:cNvPr id="1" name=""/>
+        <p:cNvGrpSpPr/>
+        <p:nvPr/>
+      </p:nvGrpSpPr>
+      <p:grpSpPr>
+        <a:xfrm>
+          <a:off x="0" y="0"/>
+          <a:ext cx="0" cy="0"/>
+          <a:chOff x="0" y="0"/>
+          <a:chExt cx="0" cy="0"/>
+        </a:xfrm>
+      </p:grpSpPr>
+      <p:pic>
+        <p:nvPicPr>
+          <p:cNvPr id="4" name="Picture 3" descr="henipavirus phylofactor.jpeg"/>
+          <p:cNvPicPr>
+            <a:picLocks noChangeAspect="1"/>
+          </p:cNvPicPr>
+          <p:nvPr/>
+        </p:nvPicPr>
+        <p:blipFill rotWithShape="1">
+          <a:blip r:embed="rId2">
+            <a:extLst>
+              <a:ext uri="{28A0092B-C50C-407E-A947-70E740481C1C}">
+                <a14:useLocalDpi xmlns:a14="http://schemas.microsoft.com/office/drawing/2010/main" val="0"/>
+              </a:ext>
+            </a:extLst>
+          </a:blip>
+          <a:srcRect l="17294" t="8550" r="17544" b="8801"/>
+          <a:stretch/>
+        </p:blipFill>
+        <p:spPr>
+          <a:xfrm>
+            <a:off x="183444" y="268112"/>
+            <a:ext cx="3091008" cy="3102896"/>
+          </a:xfrm>
+          <a:prstGeom prst="rect">
+            <a:avLst/>
+          </a:prstGeom>
+        </p:spPr>
+      </p:pic>
+      <p:pic>
+        <p:nvPicPr>
+          <p:cNvPr id="5" name="Picture 4" descr="henipavirus legend.jpeg"/>
+          <p:cNvPicPr>
+            <a:picLocks noChangeAspect="1"/>
+          </p:cNvPicPr>
+          <p:nvPr/>
+        </p:nvPicPr>
+        <p:blipFill rotWithShape="1">
+          <a:blip r:embed="rId3">
+            <a:extLst>
+              <a:ext uri="{28A0092B-C50C-407E-A947-70E740481C1C}">
+                <a14:useLocalDpi xmlns:a14="http://schemas.microsoft.com/office/drawing/2010/main" val="0"/>
+              </a:ext>
+            </a:extLst>
+          </a:blip>
+          <a:srcRect l="2343" t="4861" r="42664" b="4861"/>
+          <a:stretch/>
+        </p:blipFill>
+        <p:spPr>
+          <a:xfrm>
+            <a:off x="3476520" y="3687906"/>
+            <a:ext cx="2244326" cy="2487319"/>
+          </a:xfrm>
+          <a:prstGeom prst="rect">
+            <a:avLst/>
+          </a:prstGeom>
+        </p:spPr>
+      </p:pic>
+      <p:pic>
+        <p:nvPicPr>
+          <p:cNvPr id="6" name="Picture 5" descr="filovirus phylofactor.jpeg"/>
+          <p:cNvPicPr>
+            <a:picLocks noChangeAspect="1"/>
+          </p:cNvPicPr>
+          <p:nvPr/>
+        </p:nvPicPr>
+        <p:blipFill rotWithShape="1">
+          <a:blip r:embed="rId4">
+            <a:extLst>
+              <a:ext uri="{28A0092B-C50C-407E-A947-70E740481C1C}">
+                <a14:useLocalDpi xmlns:a14="http://schemas.microsoft.com/office/drawing/2010/main" val="0"/>
+              </a:ext>
+            </a:extLst>
+          </a:blip>
+          <a:srcRect l="16440" t="9391" r="17629" b="9176"/>
+          <a:stretch/>
+        </p:blipFill>
+        <p:spPr>
+          <a:xfrm>
+            <a:off x="147732" y="3746398"/>
+            <a:ext cx="3085826" cy="3016435"/>
+          </a:xfrm>
+          <a:prstGeom prst="rect">
+            <a:avLst/>
+          </a:prstGeom>
+        </p:spPr>
+      </p:pic>
+      <p:pic>
+        <p:nvPicPr>
+          <p:cNvPr id="7" name="Picture 6" descr="filovirus legend.jpeg"/>
+          <p:cNvPicPr>
+            <a:picLocks noChangeAspect="1"/>
+          </p:cNvPicPr>
+          <p:nvPr/>
+        </p:nvPicPr>
+        <p:blipFill rotWithShape="1">
+          <a:blip r:embed="rId5">
+            <a:extLst>
+              <a:ext uri="{28A0092B-C50C-407E-A947-70E740481C1C}">
+                <a14:useLocalDpi xmlns:a14="http://schemas.microsoft.com/office/drawing/2010/main" val="0"/>
+              </a:ext>
+            </a:extLst>
+          </a:blip>
+          <a:srcRect l="2740" t="2355" r="48538" b="43090"/>
+          <a:stretch/>
+        </p:blipFill>
+        <p:spPr>
+          <a:xfrm>
+            <a:off x="3476520" y="268112"/>
+            <a:ext cx="2265349" cy="2008117"/>
+          </a:xfrm>
+          <a:prstGeom prst="rect">
+            <a:avLst/>
+          </a:prstGeom>
+        </p:spPr>
+      </p:pic>
+      <p:sp>
+        <p:nvSpPr>
+          <p:cNvPr id="8" name="TextBox 7"/>
+          <p:cNvSpPr txBox="1"/>
+          <p:nvPr/>
+        </p:nvSpPr>
+        <p:spPr>
+          <a:xfrm>
+            <a:off x="0" y="-35701"/>
+            <a:ext cx="5288628" cy="369332"/>
+          </a:xfrm>
+          <a:prstGeom prst="rect">
+            <a:avLst/>
+          </a:prstGeom>
+          <a:noFill/>
+        </p:spPr>
+        <p:txBody>
+          <a:bodyPr wrap="square" rtlCol="0">
+            <a:spAutoFit/>
+          </a:bodyPr>
+          <a:lstStyle/>
+          <a:p>
+            <a:r>
+              <a:rPr lang="en-US" dirty="0" smtClean="0"/>
+              <a:t>Henipavirus </a:t>
+            </a:r>
+            <a:r>
+              <a:rPr lang="en-US" dirty="0" err="1" smtClean="0"/>
+              <a:t>Phylofactor</a:t>
+            </a:r>
+            <a:r>
+              <a:rPr lang="en-US" dirty="0" smtClean="0"/>
+              <a:t> Results</a:t>
+            </a:r>
+            <a:endParaRPr lang="en-US" dirty="0"/>
+          </a:p>
+        </p:txBody>
+      </p:sp>
+      <p:sp>
+        <p:nvSpPr>
+          <p:cNvPr id="9" name="TextBox 8"/>
+          <p:cNvSpPr txBox="1"/>
+          <p:nvPr/>
+        </p:nvSpPr>
+        <p:spPr>
+          <a:xfrm>
+            <a:off x="0" y="3318574"/>
+            <a:ext cx="5288628" cy="369332"/>
+          </a:xfrm>
+          <a:prstGeom prst="rect">
+            <a:avLst/>
+          </a:prstGeom>
+          <a:noFill/>
+        </p:spPr>
+        <p:txBody>
+          <a:bodyPr wrap="square" rtlCol="0">
+            <a:spAutoFit/>
+          </a:bodyPr>
+          <a:lstStyle/>
+          <a:p>
+            <a:r>
+              <a:rPr lang="en-US" dirty="0" err="1" smtClean="0"/>
+              <a:t>Filovirus</a:t>
+            </a:r>
+            <a:r>
+              <a:rPr lang="en-US" dirty="0" smtClean="0"/>
+              <a:t> </a:t>
+            </a:r>
+            <a:r>
+              <a:rPr lang="en-US" dirty="0" err="1" smtClean="0"/>
+              <a:t>Phylofactor</a:t>
+            </a:r>
+            <a:r>
+              <a:rPr lang="en-US" dirty="0" smtClean="0"/>
+              <a:t> Results</a:t>
+            </a:r>
+            <a:endParaRPr lang="en-US" dirty="0"/>
+          </a:p>
+        </p:txBody>
+      </p:sp>
+      <p:sp>
+        <p:nvSpPr>
+          <p:cNvPr id="10" name="TextBox 9"/>
+          <p:cNvSpPr txBox="1"/>
+          <p:nvPr/>
+        </p:nvSpPr>
+        <p:spPr>
+          <a:xfrm>
+            <a:off x="5946588" y="268112"/>
+            <a:ext cx="3048000" cy="1477328"/>
+          </a:xfrm>
+          <a:prstGeom prst="rect">
+            <a:avLst/>
+          </a:prstGeom>
+          <a:noFill/>
+        </p:spPr>
+        <p:txBody>
+          <a:bodyPr wrap="square" rtlCol="0">
+            <a:spAutoFit/>
+          </a:bodyPr>
+          <a:lstStyle/>
+          <a:p>
+            <a:r>
+              <a:rPr lang="en-US" dirty="0" smtClean="0"/>
+              <a:t>Figure XX. Phylofactorization of the full bat phylogeny. Outcome variable is a binary response for sampling of either Henipavirus or </a:t>
+            </a:r>
+            <a:r>
+              <a:rPr lang="en-US" dirty="0" err="1" smtClean="0"/>
+              <a:t>Filovirus</a:t>
+            </a:r>
+            <a:r>
+              <a:rPr lang="en-US" dirty="0" smtClean="0"/>
+              <a:t>.</a:t>
+            </a:r>
+            <a:endParaRPr lang="en-US" dirty="0"/>
+          </a:p>
+        </p:txBody>
+      </p:sp>
+    </p:spTree>
+    <p:extLst>
+      <p:ext uri="{BB962C8B-B14F-4D97-AF65-F5344CB8AC3E}">
+        <p14:creationId xmlns:p14="http://schemas.microsoft.com/office/powerpoint/2010/main" val="3841190850"/>
+      </p:ext>
+    </p:extLst>
+  </p:cSld>
+  <p:clrMapOvr>
+    <a:masterClrMapping/>
+  </p:clrMapOvr>
 </p:sld>
 </file>
 

</xml_diff>